<commit_message>
working on pp slodes.
</commit_message>
<xml_diff>
--- a/Consumer Behavior Analytics.pptx
+++ b/Consumer Behavior Analytics.pptx
@@ -6,11 +6,13 @@
   </p:sldMasterIdLst>
   <p:sldIdLst>
     <p:sldId id="256" r:id="rId2"/>
-    <p:sldId id="257" r:id="rId3"/>
-    <p:sldId id="259" r:id="rId4"/>
-    <p:sldId id="258" r:id="rId5"/>
-    <p:sldId id="260" r:id="rId6"/>
-    <p:sldId id="261" r:id="rId7"/>
+    <p:sldId id="262" r:id="rId3"/>
+    <p:sldId id="257" r:id="rId4"/>
+    <p:sldId id="259" r:id="rId5"/>
+    <p:sldId id="258" r:id="rId6"/>
+    <p:sldId id="260" r:id="rId7"/>
+    <p:sldId id="263" r:id="rId8"/>
+    <p:sldId id="261" r:id="rId9"/>
   </p:sldIdLst>
   <p:sldSz cx="12192000" cy="6858000"/>
   <p:notesSz cx="6858000" cy="9144000"/>
@@ -109,6 +111,11 @@
       </a:defRPr>
     </a:lvl9pPr>
   </p:defaultTextStyle>
+  <p:extLst>
+    <p:ext uri="{EFAFB233-063F-42B5-8137-9DF3F51BA10A}">
+      <p15:sldGuideLst xmlns:p15="http://schemas.microsoft.com/office/powerpoint/2012/main"/>
+    </p:ext>
+  </p:extLst>
 </p:presentation>
 </file>
 
@@ -259,7 +266,7 @@
           <a:p>
             <a:fld id="{124634B9-1A4B-4F6D-9498-707A4FDF20D1}" type="datetimeFigureOut">
               <a:rPr lang="en-US" smtClean="0"/>
-              <a:t>12/3/2018</a:t>
+              <a:t>12/4/2018</a:t>
             </a:fld>
             <a:endParaRPr lang="en-US"/>
           </a:p>
@@ -457,7 +464,7 @@
           <a:p>
             <a:fld id="{124634B9-1A4B-4F6D-9498-707A4FDF20D1}" type="datetimeFigureOut">
               <a:rPr lang="en-US" smtClean="0"/>
-              <a:t>12/3/2018</a:t>
+              <a:t>12/4/2018</a:t>
             </a:fld>
             <a:endParaRPr lang="en-US"/>
           </a:p>
@@ -665,7 +672,7 @@
           <a:p>
             <a:fld id="{124634B9-1A4B-4F6D-9498-707A4FDF20D1}" type="datetimeFigureOut">
               <a:rPr lang="en-US" smtClean="0"/>
-              <a:t>12/3/2018</a:t>
+              <a:t>12/4/2018</a:t>
             </a:fld>
             <a:endParaRPr lang="en-US"/>
           </a:p>
@@ -863,7 +870,7 @@
           <a:p>
             <a:fld id="{124634B9-1A4B-4F6D-9498-707A4FDF20D1}" type="datetimeFigureOut">
               <a:rPr lang="en-US" smtClean="0"/>
-              <a:t>12/3/2018</a:t>
+              <a:t>12/4/2018</a:t>
             </a:fld>
             <a:endParaRPr lang="en-US"/>
           </a:p>
@@ -1138,7 +1145,7 @@
           <a:p>
             <a:fld id="{124634B9-1A4B-4F6D-9498-707A4FDF20D1}" type="datetimeFigureOut">
               <a:rPr lang="en-US" smtClean="0"/>
-              <a:t>12/3/2018</a:t>
+              <a:t>12/4/2018</a:t>
             </a:fld>
             <a:endParaRPr lang="en-US"/>
           </a:p>
@@ -1403,7 +1410,7 @@
           <a:p>
             <a:fld id="{124634B9-1A4B-4F6D-9498-707A4FDF20D1}" type="datetimeFigureOut">
               <a:rPr lang="en-US" smtClean="0"/>
-              <a:t>12/3/2018</a:t>
+              <a:t>12/4/2018</a:t>
             </a:fld>
             <a:endParaRPr lang="en-US"/>
           </a:p>
@@ -1815,7 +1822,7 @@
           <a:p>
             <a:fld id="{124634B9-1A4B-4F6D-9498-707A4FDF20D1}" type="datetimeFigureOut">
               <a:rPr lang="en-US" smtClean="0"/>
-              <a:t>12/3/2018</a:t>
+              <a:t>12/4/2018</a:t>
             </a:fld>
             <a:endParaRPr lang="en-US"/>
           </a:p>
@@ -1956,7 +1963,7 @@
           <a:p>
             <a:fld id="{124634B9-1A4B-4F6D-9498-707A4FDF20D1}" type="datetimeFigureOut">
               <a:rPr lang="en-US" smtClean="0"/>
-              <a:t>12/3/2018</a:t>
+              <a:t>12/4/2018</a:t>
             </a:fld>
             <a:endParaRPr lang="en-US"/>
           </a:p>
@@ -2069,7 +2076,7 @@
           <a:p>
             <a:fld id="{124634B9-1A4B-4F6D-9498-707A4FDF20D1}" type="datetimeFigureOut">
               <a:rPr lang="en-US" smtClean="0"/>
-              <a:t>12/3/2018</a:t>
+              <a:t>12/4/2018</a:t>
             </a:fld>
             <a:endParaRPr lang="en-US"/>
           </a:p>
@@ -2380,7 +2387,7 @@
           <a:p>
             <a:fld id="{124634B9-1A4B-4F6D-9498-707A4FDF20D1}" type="datetimeFigureOut">
               <a:rPr lang="en-US" smtClean="0"/>
-              <a:t>12/3/2018</a:t>
+              <a:t>12/4/2018</a:t>
             </a:fld>
             <a:endParaRPr lang="en-US"/>
           </a:p>
@@ -2668,7 +2675,7 @@
           <a:p>
             <a:fld id="{124634B9-1A4B-4F6D-9498-707A4FDF20D1}" type="datetimeFigureOut">
               <a:rPr lang="en-US" smtClean="0"/>
-              <a:t>12/3/2018</a:t>
+              <a:t>12/4/2018</a:t>
             </a:fld>
             <a:endParaRPr lang="en-US"/>
           </a:p>
@@ -2909,7 +2916,7 @@
           <a:p>
             <a:fld id="{124634B9-1A4B-4F6D-9498-707A4FDF20D1}" type="datetimeFigureOut">
               <a:rPr lang="en-US" smtClean="0"/>
-              <a:t>12/3/2018</a:t>
+              <a:t>12/4/2018</a:t>
             </a:fld>
             <a:endParaRPr lang="en-US"/>
           </a:p>
@@ -3312,6 +3319,14 @@
 <file path=ppt/slides/slide1.xml><?xml version="1.0" encoding="utf-8"?>
 <p:sld xmlns:a="http://schemas.openxmlformats.org/drawingml/2006/main" xmlns:r="http://schemas.openxmlformats.org/officeDocument/2006/relationships" xmlns:p="http://schemas.openxmlformats.org/presentationml/2006/main">
   <p:cSld>
+    <p:bg>
+      <p:bgPr>
+        <a:solidFill>
+          <a:schemeClr val="bg1"/>
+        </a:solidFill>
+        <a:effectLst/>
+      </p:bgPr>
+    </p:bg>
     <p:spTree>
       <p:nvGrpSpPr>
         <p:cNvPr id="1" name=""/>
@@ -3326,6 +3341,95 @@
           <a:chExt cx="0" cy="0"/>
         </a:xfrm>
       </p:grpSpPr>
+      <p:sp useBgFill="1">
+        <p:nvSpPr>
+          <p:cNvPr id="8" name="Rectangle 7">
+            <a:extLst>
+              <a:ext uri="{FF2B5EF4-FFF2-40B4-BE49-F238E27FC236}">
+                <a16:creationId xmlns:a16="http://schemas.microsoft.com/office/drawing/2014/main" id="{559AE206-7EBA-4D33-8BC9-9D8158553F0E}"/>
+              </a:ext>
+              <a:ext uri="{C183D7F6-B498-43B3-948B-1728B52AA6E4}">
+                <adec:decorative xmlns:adec="http://schemas.microsoft.com/office/drawing/2017/decorative" val="1"/>
+              </a:ext>
+            </a:extLst>
+          </p:cNvPr>
+          <p:cNvSpPr>
+            <a:spLocks noGrp="1" noRot="1" noChangeAspect="1" noMove="1" noResize="1" noEditPoints="1" noAdjustHandles="1" noChangeArrowheads="1" noChangeShapeType="1" noTextEdit="1"/>
+          </p:cNvSpPr>
+          <p:nvPr>
+            <p:extLst>
+              <p:ext uri="{386F3935-93C4-4BCD-93E2-E3B085C9AB24}">
+                <p16:designElem xmlns:p16="http://schemas.microsoft.com/office/powerpoint/2015/main" val="1"/>
+              </p:ext>
+            </p:extLst>
+          </p:nvPr>
+        </p:nvSpPr>
+        <p:spPr>
+          <a:xfrm>
+            <a:off x="0" y="0"/>
+            <a:ext cx="12192000" cy="6858000"/>
+          </a:xfrm>
+          <a:prstGeom prst="rect">
+            <a:avLst/>
+          </a:prstGeom>
+          <a:ln>
+            <a:noFill/>
+          </a:ln>
+        </p:spPr>
+        <p:style>
+          <a:lnRef idx="2">
+            <a:schemeClr val="accent1">
+              <a:shade val="50000"/>
+            </a:schemeClr>
+          </a:lnRef>
+          <a:fillRef idx="1">
+            <a:schemeClr val="accent1"/>
+          </a:fillRef>
+          <a:effectRef idx="0">
+            <a:schemeClr val="accent1"/>
+          </a:effectRef>
+          <a:fontRef idx="minor">
+            <a:schemeClr val="lt1"/>
+          </a:fontRef>
+        </p:style>
+        <p:txBody>
+          <a:bodyPr rtlCol="0" anchor="ctr"/>
+          <a:lstStyle/>
+          <a:p>
+            <a:pPr marL="0" marR="0" lvl="0" indent="0" algn="ctr" defTabSz="914400" rtl="0" eaLnBrk="1" fontAlgn="auto" latinLnBrk="0" hangingPunct="1">
+              <a:lnSpc>
+                <a:spcPct val="100000"/>
+              </a:lnSpc>
+              <a:spcBef>
+                <a:spcPts val="0"/>
+              </a:spcBef>
+              <a:spcAft>
+                <a:spcPts val="0"/>
+              </a:spcAft>
+              <a:buClrTx/>
+              <a:buSzTx/>
+              <a:buFontTx/>
+              <a:buNone/>
+              <a:tabLst/>
+              <a:defRPr/>
+            </a:pPr>
+            <a:endParaRPr kumimoji="0" lang="en-US" sz="1800" b="0" i="0" u="none" strike="noStrike" kern="1200" cap="none" spc="0" normalizeH="0" baseline="0" noProof="0">
+              <a:ln>
+                <a:noFill/>
+              </a:ln>
+              <a:solidFill>
+                <a:prstClr val="white"/>
+              </a:solidFill>
+              <a:effectLst/>
+              <a:uLnTx/>
+              <a:uFillTx/>
+              <a:latin typeface="Calibri" panose="020F0502020204030204"/>
+              <a:ea typeface="+mn-ea"/>
+              <a:cs typeface="+mn-cs"/>
+            </a:endParaRPr>
+          </a:p>
+        </p:txBody>
+      </p:sp>
       <p:sp>
         <p:nvSpPr>
           <p:cNvPr id="2" name="Title 1">
@@ -3342,15 +3446,24 @@
             <p:ph type="ctrTitle"/>
           </p:nvPr>
         </p:nvSpPr>
-        <p:spPr/>
-        <p:txBody>
-          <a:bodyPr/>
-          <a:lstStyle/>
-          <a:p>
+        <p:spPr>
+          <a:xfrm>
+            <a:off x="838199" y="4525347"/>
+            <a:ext cx="6801321" cy="1737360"/>
+          </a:xfrm>
+        </p:spPr>
+        <p:txBody>
+          <a:bodyPr anchor="ctr">
+            <a:normAutofit/>
+          </a:bodyPr>
+          <a:lstStyle/>
+          <a:p>
+            <a:pPr algn="r"/>
             <a:r>
               <a:rPr lang="en-US" dirty="0"/>
               <a:t>Consumer Behavior Analytics</a:t>
             </a:r>
+            <a:endParaRPr lang="en-US"/>
           </a:p>
         </p:txBody>
       </p:sp>
@@ -3370,11 +3483,19 @@
             <p:ph type="subTitle" idx="1"/>
           </p:nvPr>
         </p:nvSpPr>
-        <p:spPr/>
-        <p:txBody>
-          <a:bodyPr/>
-          <a:lstStyle/>
-          <a:p>
+        <p:spPr>
+          <a:xfrm>
+            <a:off x="7961258" y="4525347"/>
+            <a:ext cx="3258675" cy="1737360"/>
+          </a:xfrm>
+        </p:spPr>
+        <p:txBody>
+          <a:bodyPr anchor="ctr">
+            <a:normAutofit/>
+          </a:bodyPr>
+          <a:lstStyle/>
+          <a:p>
+            <a:pPr algn="l"/>
             <a:r>
               <a:rPr lang="en-US" dirty="0"/>
               <a:t>Francis Troy </a:t>
@@ -3383,9 +3504,10 @@
               <a:rPr lang="en-US" dirty="0" err="1"/>
               <a:t>Kirinhakone</a:t>
             </a:r>
-            <a:endParaRPr lang="en-US" dirty="0"/>
-          </a:p>
-          <a:p>
+            <a:endParaRPr lang="en-US"/>
+          </a:p>
+          <a:p>
+            <a:pPr algn="l"/>
             <a:r>
               <a:rPr lang="en-US" dirty="0"/>
               <a:t>Carlos He </a:t>
@@ -3394,10 +3516,493 @@
               <a:rPr lang="en-US" dirty="0" err="1"/>
               <a:t>He</a:t>
             </a:r>
-            <a:endParaRPr lang="en-US" dirty="0"/>
-          </a:p>
-        </p:txBody>
-      </p:sp>
+            <a:endParaRPr lang="en-US"/>
+          </a:p>
+        </p:txBody>
+      </p:sp>
+      <p:sp>
+        <p:nvSpPr>
+          <p:cNvPr id="10" name="Oval 9">
+            <a:extLst>
+              <a:ext uri="{FF2B5EF4-FFF2-40B4-BE49-F238E27FC236}">
+                <a16:creationId xmlns:a16="http://schemas.microsoft.com/office/drawing/2014/main" id="{6437D937-A7F1-4011-92B4-328E5BE1B166}"/>
+              </a:ext>
+              <a:ext uri="{C183D7F6-B498-43B3-948B-1728B52AA6E4}">
+                <adec:decorative xmlns:adec="http://schemas.microsoft.com/office/drawing/2017/decorative" val="1"/>
+              </a:ext>
+            </a:extLst>
+          </p:cNvPr>
+          <p:cNvSpPr>
+            <a:spLocks noGrp="1" noRot="1" noChangeAspect="1" noMove="1" noResize="1" noEditPoints="1" noAdjustHandles="1" noChangeArrowheads="1" noChangeShapeType="1" noTextEdit="1"/>
+          </p:cNvSpPr>
+          <p:nvPr>
+            <p:extLst>
+              <p:ext uri="{386F3935-93C4-4BCD-93E2-E3B085C9AB24}">
+                <p16:designElem xmlns:p16="http://schemas.microsoft.com/office/powerpoint/2015/main" val="1"/>
+              </p:ext>
+            </p:extLst>
+          </p:nvPr>
+        </p:nvSpPr>
+        <p:spPr>
+          <a:xfrm>
+            <a:off x="588567" y="620480"/>
+            <a:ext cx="2243800" cy="2243796"/>
+          </a:xfrm>
+          <a:prstGeom prst="ellipse">
+            <a:avLst/>
+          </a:prstGeom>
+          <a:solidFill>
+            <a:schemeClr val="accent5"/>
+          </a:solidFill>
+          <a:ln>
+            <a:noFill/>
+          </a:ln>
+        </p:spPr>
+        <p:style>
+          <a:lnRef idx="2">
+            <a:schemeClr val="accent1">
+              <a:shade val="50000"/>
+            </a:schemeClr>
+          </a:lnRef>
+          <a:fillRef idx="1">
+            <a:schemeClr val="accent1"/>
+          </a:fillRef>
+          <a:effectRef idx="0">
+            <a:schemeClr val="accent1"/>
+          </a:effectRef>
+          <a:fontRef idx="minor">
+            <a:schemeClr val="lt1"/>
+          </a:fontRef>
+        </p:style>
+        <p:txBody>
+          <a:bodyPr rtlCol="0" anchor="ctr"/>
+          <a:lstStyle/>
+          <a:p>
+            <a:pPr marL="0" marR="0" lvl="0" indent="0" algn="ctr" defTabSz="914400" rtl="0" eaLnBrk="1" fontAlgn="auto" latinLnBrk="0" hangingPunct="1">
+              <a:lnSpc>
+                <a:spcPct val="100000"/>
+              </a:lnSpc>
+              <a:spcBef>
+                <a:spcPts val="0"/>
+              </a:spcBef>
+              <a:spcAft>
+                <a:spcPts val="0"/>
+              </a:spcAft>
+              <a:buClrTx/>
+              <a:buSzTx/>
+              <a:buFontTx/>
+              <a:buNone/>
+              <a:tabLst/>
+              <a:defRPr/>
+            </a:pPr>
+            <a:endParaRPr kumimoji="0" lang="en-US" sz="1800" b="0" i="0" u="none" strike="noStrike" kern="1200" cap="none" spc="0" normalizeH="0" baseline="0" noProof="0">
+              <a:ln>
+                <a:noFill/>
+              </a:ln>
+              <a:solidFill>
+                <a:prstClr val="white"/>
+              </a:solidFill>
+              <a:effectLst/>
+              <a:uLnTx/>
+              <a:uFillTx/>
+              <a:latin typeface="Calibri" panose="020F0502020204030204"/>
+              <a:ea typeface="+mn-ea"/>
+              <a:cs typeface="+mn-cs"/>
+            </a:endParaRPr>
+          </a:p>
+        </p:txBody>
+      </p:sp>
+      <p:sp>
+        <p:nvSpPr>
+          <p:cNvPr id="12" name="Oval 11">
+            <a:extLst>
+              <a:ext uri="{FF2B5EF4-FFF2-40B4-BE49-F238E27FC236}">
+                <a16:creationId xmlns:a16="http://schemas.microsoft.com/office/drawing/2014/main" id="{B672F332-AF08-46C6-94F0-77684310D7B7}"/>
+              </a:ext>
+              <a:ext uri="{C183D7F6-B498-43B3-948B-1728B52AA6E4}">
+                <adec:decorative xmlns:adec="http://schemas.microsoft.com/office/drawing/2017/decorative" val="1"/>
+              </a:ext>
+            </a:extLst>
+          </p:cNvPr>
+          <p:cNvSpPr>
+            <a:spLocks noGrp="1" noRot="1" noChangeAspect="1" noMove="1" noResize="1" noEditPoints="1" noAdjustHandles="1" noChangeArrowheads="1" noChangeShapeType="1" noTextEdit="1"/>
+          </p:cNvSpPr>
+          <p:nvPr>
+            <p:extLst>
+              <p:ext uri="{386F3935-93C4-4BCD-93E2-E3B085C9AB24}">
+                <p16:designElem xmlns:p16="http://schemas.microsoft.com/office/powerpoint/2015/main" val="1"/>
+              </p:ext>
+            </p:extLst>
+          </p:nvPr>
+        </p:nvSpPr>
+        <p:spPr>
+          <a:xfrm>
+            <a:off x="3395001" y="2466604"/>
+            <a:ext cx="962395" cy="962395"/>
+          </a:xfrm>
+          <a:prstGeom prst="ellipse">
+            <a:avLst/>
+          </a:prstGeom>
+          <a:solidFill>
+            <a:schemeClr val="accent4"/>
+          </a:solidFill>
+          <a:ln>
+            <a:noFill/>
+          </a:ln>
+        </p:spPr>
+        <p:style>
+          <a:lnRef idx="2">
+            <a:schemeClr val="accent1">
+              <a:shade val="50000"/>
+            </a:schemeClr>
+          </a:lnRef>
+          <a:fillRef idx="1">
+            <a:schemeClr val="accent1"/>
+          </a:fillRef>
+          <a:effectRef idx="0">
+            <a:schemeClr val="accent1"/>
+          </a:effectRef>
+          <a:fontRef idx="minor">
+            <a:schemeClr val="lt1"/>
+          </a:fontRef>
+        </p:style>
+        <p:txBody>
+          <a:bodyPr rtlCol="0" anchor="ctr"/>
+          <a:lstStyle/>
+          <a:p>
+            <a:pPr marL="0" marR="0" lvl="0" indent="0" algn="ctr" defTabSz="914400" rtl="0" eaLnBrk="1" fontAlgn="auto" latinLnBrk="0" hangingPunct="1">
+              <a:lnSpc>
+                <a:spcPct val="100000"/>
+              </a:lnSpc>
+              <a:spcBef>
+                <a:spcPts val="0"/>
+              </a:spcBef>
+              <a:spcAft>
+                <a:spcPts val="0"/>
+              </a:spcAft>
+              <a:buClrTx/>
+              <a:buSzTx/>
+              <a:buFontTx/>
+              <a:buNone/>
+              <a:tabLst/>
+              <a:defRPr/>
+            </a:pPr>
+            <a:endParaRPr kumimoji="0" lang="en-US" sz="1800" b="0" i="0" u="none" strike="noStrike" kern="1200" cap="none" spc="0" normalizeH="0" baseline="0" noProof="0">
+              <a:ln>
+                <a:noFill/>
+              </a:ln>
+              <a:solidFill>
+                <a:prstClr val="white"/>
+              </a:solidFill>
+              <a:effectLst/>
+              <a:uLnTx/>
+              <a:uFillTx/>
+              <a:latin typeface="Calibri" panose="020F0502020204030204"/>
+              <a:ea typeface="+mn-ea"/>
+              <a:cs typeface="+mn-cs"/>
+            </a:endParaRPr>
+          </a:p>
+        </p:txBody>
+      </p:sp>
+      <p:sp>
+        <p:nvSpPr>
+          <p:cNvPr id="14" name="Oval 13">
+            <a:extLst>
+              <a:ext uri="{FF2B5EF4-FFF2-40B4-BE49-F238E27FC236}">
+                <a16:creationId xmlns:a16="http://schemas.microsoft.com/office/drawing/2014/main" id="{34244EF8-D73A-40E1-BE73-D46E6B4B04ED}"/>
+              </a:ext>
+              <a:ext uri="{C183D7F6-B498-43B3-948B-1728B52AA6E4}">
+                <adec:decorative xmlns:adec="http://schemas.microsoft.com/office/drawing/2017/decorative" val="1"/>
+              </a:ext>
+            </a:extLst>
+          </p:cNvPr>
+          <p:cNvSpPr>
+            <a:spLocks noGrp="1" noRot="1" noChangeAspect="1" noMove="1" noResize="1" noEditPoints="1" noAdjustHandles="1" noChangeArrowheads="1" noChangeShapeType="1" noTextEdit="1"/>
+          </p:cNvSpPr>
+          <p:nvPr>
+            <p:extLst>
+              <p:ext uri="{386F3935-93C4-4BCD-93E2-E3B085C9AB24}">
+                <p16:designElem xmlns:p16="http://schemas.microsoft.com/office/powerpoint/2015/main" val="1"/>
+              </p:ext>
+            </p:extLst>
+          </p:nvPr>
+        </p:nvSpPr>
+        <p:spPr>
+          <a:xfrm>
+            <a:off x="5125829" y="2327988"/>
+            <a:ext cx="293695" cy="293695"/>
+          </a:xfrm>
+          <a:prstGeom prst="ellipse">
+            <a:avLst/>
+          </a:prstGeom>
+          <a:solidFill>
+            <a:schemeClr val="accent3"/>
+          </a:solidFill>
+          <a:ln>
+            <a:noFill/>
+          </a:ln>
+        </p:spPr>
+        <p:style>
+          <a:lnRef idx="2">
+            <a:schemeClr val="accent1">
+              <a:shade val="50000"/>
+            </a:schemeClr>
+          </a:lnRef>
+          <a:fillRef idx="1">
+            <a:schemeClr val="accent1"/>
+          </a:fillRef>
+          <a:effectRef idx="0">
+            <a:schemeClr val="accent1"/>
+          </a:effectRef>
+          <a:fontRef idx="minor">
+            <a:schemeClr val="lt1"/>
+          </a:fontRef>
+        </p:style>
+        <p:txBody>
+          <a:bodyPr rtlCol="0" anchor="ctr"/>
+          <a:lstStyle/>
+          <a:p>
+            <a:pPr marL="0" marR="0" lvl="0" indent="0" algn="ctr" defTabSz="914400" rtl="0" eaLnBrk="1" fontAlgn="auto" latinLnBrk="0" hangingPunct="1">
+              <a:lnSpc>
+                <a:spcPct val="100000"/>
+              </a:lnSpc>
+              <a:spcBef>
+                <a:spcPts val="0"/>
+              </a:spcBef>
+              <a:spcAft>
+                <a:spcPts val="0"/>
+              </a:spcAft>
+              <a:buClrTx/>
+              <a:buSzTx/>
+              <a:buFontTx/>
+              <a:buNone/>
+              <a:tabLst/>
+              <a:defRPr/>
+            </a:pPr>
+            <a:endParaRPr kumimoji="0" lang="en-US" sz="1800" b="0" i="0" u="none" strike="noStrike" kern="1200" cap="none" spc="0" normalizeH="0" baseline="0" noProof="0">
+              <a:ln>
+                <a:noFill/>
+              </a:ln>
+              <a:solidFill>
+                <a:prstClr val="white"/>
+              </a:solidFill>
+              <a:effectLst/>
+              <a:uLnTx/>
+              <a:uFillTx/>
+              <a:latin typeface="Calibri" panose="020F0502020204030204"/>
+              <a:ea typeface="+mn-ea"/>
+              <a:cs typeface="+mn-cs"/>
+            </a:endParaRPr>
+          </a:p>
+        </p:txBody>
+      </p:sp>
+      <p:sp>
+        <p:nvSpPr>
+          <p:cNvPr id="16" name="Freeform: Shape 15">
+            <a:extLst>
+              <a:ext uri="{FF2B5EF4-FFF2-40B4-BE49-F238E27FC236}">
+                <a16:creationId xmlns:a16="http://schemas.microsoft.com/office/drawing/2014/main" id="{AB84D7E8-4ECB-42D7-ADBF-01689B0F24AE}"/>
+              </a:ext>
+              <a:ext uri="{C183D7F6-B498-43B3-948B-1728B52AA6E4}">
+                <adec:decorative xmlns:adec="http://schemas.microsoft.com/office/drawing/2017/decorative" val="1"/>
+              </a:ext>
+            </a:extLst>
+          </p:cNvPr>
+          <p:cNvSpPr>
+            <a:spLocks noGrp="1" noRot="1" noChangeAspect="1" noMove="1" noResize="1" noEditPoints="1" noAdjustHandles="1" noChangeArrowheads="1" noChangeShapeType="1" noTextEdit="1"/>
+          </p:cNvSpPr>
+          <p:nvPr>
+            <p:extLst>
+              <p:ext uri="{386F3935-93C4-4BCD-93E2-E3B085C9AB24}">
+                <p16:designElem xmlns:p16="http://schemas.microsoft.com/office/powerpoint/2015/main" val="1"/>
+              </p:ext>
+            </p:extLst>
+          </p:nvPr>
+        </p:nvSpPr>
+        <p:spPr>
+          <a:xfrm>
+            <a:off x="6492113" y="0"/>
+            <a:ext cx="5699887" cy="4059244"/>
+          </a:xfrm>
+          <a:custGeom>
+            <a:avLst/>
+            <a:gdLst>
+              <a:gd name="connsiteX0" fmla="*/ 0 w 5699887"/>
+              <a:gd name="connsiteY0" fmla="*/ 0 h 4059244"/>
+              <a:gd name="connsiteX1" fmla="*/ 5699887 w 5699887"/>
+              <a:gd name="connsiteY1" fmla="*/ 0 h 4059244"/>
+              <a:gd name="connsiteX2" fmla="*/ 5699887 w 5699887"/>
+              <a:gd name="connsiteY2" fmla="*/ 3944096 h 4059244"/>
+              <a:gd name="connsiteX3" fmla="*/ 5525775 w 5699887"/>
+              <a:gd name="connsiteY3" fmla="*/ 3980429 h 4059244"/>
+              <a:gd name="connsiteX4" fmla="*/ 4663256 w 5699887"/>
+              <a:gd name="connsiteY4" fmla="*/ 4059244 h 4059244"/>
+              <a:gd name="connsiteX5" fmla="*/ 8566 w 5699887"/>
+              <a:gd name="connsiteY5" fmla="*/ 67422 h 4059244"/>
+            </a:gdLst>
+            <a:ahLst/>
+            <a:cxnLst>
+              <a:cxn ang="0">
+                <a:pos x="connsiteX0" y="connsiteY0"/>
+              </a:cxn>
+              <a:cxn ang="0">
+                <a:pos x="connsiteX1" y="connsiteY1"/>
+              </a:cxn>
+              <a:cxn ang="0">
+                <a:pos x="connsiteX2" y="connsiteY2"/>
+              </a:cxn>
+              <a:cxn ang="0">
+                <a:pos x="connsiteX3" y="connsiteY3"/>
+              </a:cxn>
+              <a:cxn ang="0">
+                <a:pos x="connsiteX4" y="connsiteY4"/>
+              </a:cxn>
+              <a:cxn ang="0">
+                <a:pos x="connsiteX5" y="connsiteY5"/>
+              </a:cxn>
+            </a:cxnLst>
+            <a:rect l="l" t="t" r="r" b="b"/>
+            <a:pathLst>
+              <a:path w="5699887" h="4059244">
+                <a:moveTo>
+                  <a:pt x="0" y="0"/>
+                </a:moveTo>
+                <a:lnTo>
+                  <a:pt x="5699887" y="0"/>
+                </a:lnTo>
+                <a:lnTo>
+                  <a:pt x="5699887" y="3944096"/>
+                </a:lnTo>
+                <a:lnTo>
+                  <a:pt x="5525775" y="3980429"/>
+                </a:lnTo>
+                <a:cubicBezTo>
+                  <a:pt x="5246154" y="4032190"/>
+                  <a:pt x="4957865" y="4059244"/>
+                  <a:pt x="4663256" y="4059244"/>
+                </a:cubicBezTo>
+                <a:cubicBezTo>
+                  <a:pt x="2306390" y="4059244"/>
+                  <a:pt x="353936" y="2327747"/>
+                  <a:pt x="8566" y="67422"/>
+                </a:cubicBezTo>
+                <a:close/>
+              </a:path>
+            </a:pathLst>
+          </a:custGeom>
+          <a:solidFill>
+            <a:srgbClr val="595959"/>
+          </a:solidFill>
+          <a:ln>
+            <a:noFill/>
+          </a:ln>
+        </p:spPr>
+        <p:style>
+          <a:lnRef idx="2">
+            <a:schemeClr val="accent1">
+              <a:shade val="50000"/>
+            </a:schemeClr>
+          </a:lnRef>
+          <a:fillRef idx="1">
+            <a:schemeClr val="accent1"/>
+          </a:fillRef>
+          <a:effectRef idx="0">
+            <a:schemeClr val="accent1"/>
+          </a:effectRef>
+          <a:fontRef idx="minor">
+            <a:schemeClr val="lt1"/>
+          </a:fontRef>
+        </p:style>
+        <p:txBody>
+          <a:bodyPr rtlCol="0" anchor="ctr"/>
+          <a:lstStyle/>
+          <a:p>
+            <a:pPr marL="0" marR="0" lvl="0" indent="0" algn="ctr" defTabSz="914400" rtl="0" eaLnBrk="1" fontAlgn="auto" latinLnBrk="0" hangingPunct="1">
+              <a:lnSpc>
+                <a:spcPct val="100000"/>
+              </a:lnSpc>
+              <a:spcBef>
+                <a:spcPts val="0"/>
+              </a:spcBef>
+              <a:spcAft>
+                <a:spcPts val="0"/>
+              </a:spcAft>
+              <a:buClrTx/>
+              <a:buSzTx/>
+              <a:buFontTx/>
+              <a:buNone/>
+              <a:tabLst/>
+              <a:defRPr/>
+            </a:pPr>
+            <a:endParaRPr kumimoji="0" lang="en-US" sz="1800" b="0" i="0" u="none" strike="noStrike" kern="1200" cap="none" spc="0" normalizeH="0" baseline="0" noProof="0">
+              <a:ln>
+                <a:noFill/>
+              </a:ln>
+              <a:solidFill>
+                <a:prstClr val="white"/>
+              </a:solidFill>
+              <a:effectLst/>
+              <a:uLnTx/>
+              <a:uFillTx/>
+              <a:latin typeface="Calibri" panose="020F0502020204030204"/>
+              <a:ea typeface="+mn-ea"/>
+              <a:cs typeface="+mn-cs"/>
+            </a:endParaRPr>
+          </a:p>
+        </p:txBody>
+      </p:sp>
+      <p:cxnSp>
+        <p:nvCxnSpPr>
+          <p:cNvPr id="18" name="Straight Connector 17">
+            <a:extLst>
+              <a:ext uri="{FF2B5EF4-FFF2-40B4-BE49-F238E27FC236}">
+                <a16:creationId xmlns:a16="http://schemas.microsoft.com/office/drawing/2014/main" id="{9E8E38ED-369A-44C2-B635-0BED0E48A6E8}"/>
+              </a:ext>
+              <a:ext uri="{C183D7F6-B498-43B3-948B-1728B52AA6E4}">
+                <adec:decorative xmlns:adec="http://schemas.microsoft.com/office/drawing/2017/decorative" val="1"/>
+              </a:ext>
+            </a:extLst>
+          </p:cNvPr>
+          <p:cNvCxnSpPr>
+            <a:cxnSpLocks noGrp="1" noRot="1" noChangeAspect="1" noMove="1" noResize="1" noEditPoints="1" noAdjustHandles="1" noChangeArrowheads="1" noChangeShapeType="1"/>
+          </p:cNvCxnSpPr>
+          <p:nvPr>
+            <p:extLst>
+              <p:ext uri="{386F3935-93C4-4BCD-93E2-E3B085C9AB24}">
+                <p16:designElem xmlns:p16="http://schemas.microsoft.com/office/powerpoint/2015/main" val="1"/>
+              </p:ext>
+            </p:extLst>
+          </p:nvPr>
+        </p:nvCxnSpPr>
+        <p:spPr>
+          <a:xfrm>
+            <a:off x="7800392" y="4525347"/>
+            <a:ext cx="0" cy="1737360"/>
+          </a:xfrm>
+          <a:prstGeom prst="line">
+            <a:avLst/>
+          </a:prstGeom>
+          <a:ln w="19050" cap="sq">
+            <a:solidFill>
+              <a:schemeClr val="tx1"/>
+            </a:solidFill>
+          </a:ln>
+        </p:spPr>
+        <p:style>
+          <a:lnRef idx="1">
+            <a:schemeClr val="accent1"/>
+          </a:lnRef>
+          <a:fillRef idx="0">
+            <a:schemeClr val="accent1"/>
+          </a:fillRef>
+          <a:effectRef idx="0">
+            <a:schemeClr val="accent1"/>
+          </a:effectRef>
+          <a:fontRef idx="minor">
+            <a:schemeClr val="tx1"/>
+          </a:fontRef>
+        </p:style>
+      </p:cxnSp>
     </p:spTree>
     <p:extLst>
       <p:ext uri="{BB962C8B-B14F-4D97-AF65-F5344CB8AC3E}">
@@ -3412,6 +4017,257 @@
 </file>
 
 <file path=ppt/slides/slide2.xml><?xml version="1.0" encoding="utf-8"?>
+<p:sld xmlns:a="http://schemas.openxmlformats.org/drawingml/2006/main" xmlns:r="http://schemas.openxmlformats.org/officeDocument/2006/relationships" xmlns:p="http://schemas.openxmlformats.org/presentationml/2006/main">
+  <p:cSld>
+    <p:bg>
+      <p:bgPr>
+        <a:solidFill>
+          <a:schemeClr val="bg1"/>
+        </a:solidFill>
+        <a:effectLst/>
+      </p:bgPr>
+    </p:bg>
+    <p:spTree>
+      <p:nvGrpSpPr>
+        <p:cNvPr id="1" name=""/>
+        <p:cNvGrpSpPr/>
+        <p:nvPr/>
+      </p:nvGrpSpPr>
+      <p:grpSpPr>
+        <a:xfrm>
+          <a:off x="0" y="0"/>
+          <a:ext cx="0" cy="0"/>
+          <a:chOff x="0" y="0"/>
+          <a:chExt cx="0" cy="0"/>
+        </a:xfrm>
+      </p:grpSpPr>
+      <p:sp>
+        <p:nvSpPr>
+          <p:cNvPr id="71" name="Rectangle 70">
+            <a:extLst>
+              <a:ext uri="{FF2B5EF4-FFF2-40B4-BE49-F238E27FC236}">
+                <a16:creationId xmlns:a16="http://schemas.microsoft.com/office/drawing/2014/main" id="{867D4867-5BA7-4462-B2F6-A23F4A622AA7}"/>
+              </a:ext>
+              <a:ext uri="{C183D7F6-B498-43B3-948B-1728B52AA6E4}">
+                <adec:decorative xmlns:adec="http://schemas.microsoft.com/office/drawing/2017/decorative" val="1"/>
+              </a:ext>
+            </a:extLst>
+          </p:cNvPr>
+          <p:cNvSpPr>
+            <a:spLocks noGrp="1" noRot="1" noChangeAspect="1" noMove="1" noResize="1" noEditPoints="1" noAdjustHandles="1" noChangeArrowheads="1" noChangeShapeType="1" noTextEdit="1"/>
+          </p:cNvSpPr>
+          <p:nvPr>
+            <p:extLst>
+              <p:ext uri="{386F3935-93C4-4BCD-93E2-E3B085C9AB24}">
+                <p16:designElem xmlns:p16="http://schemas.microsoft.com/office/powerpoint/2015/main" val="1"/>
+              </p:ext>
+            </p:extLst>
+          </p:nvPr>
+        </p:nvSpPr>
+        <p:spPr>
+          <a:xfrm>
+            <a:off x="0" y="0"/>
+            <a:ext cx="4654296" cy="6858000"/>
+          </a:xfrm>
+          <a:prstGeom prst="rect">
+            <a:avLst/>
+          </a:prstGeom>
+          <a:solidFill>
+            <a:schemeClr val="tx1">
+              <a:lumMod val="75000"/>
+              <a:lumOff val="25000"/>
+            </a:schemeClr>
+          </a:solidFill>
+          <a:ln>
+            <a:noFill/>
+          </a:ln>
+        </p:spPr>
+        <p:style>
+          <a:lnRef idx="0">
+            <a:scrgbClr r="0" g="0" b="0"/>
+          </a:lnRef>
+          <a:fillRef idx="0">
+            <a:scrgbClr r="0" g="0" b="0"/>
+          </a:fillRef>
+          <a:effectRef idx="0">
+            <a:scrgbClr r="0" g="0" b="0"/>
+          </a:effectRef>
+          <a:fontRef idx="minor">
+            <a:schemeClr val="lt1"/>
+          </a:fontRef>
+        </p:style>
+        <p:txBody>
+          <a:bodyPr rtlCol="0" anchor="ctr"/>
+          <a:lstStyle/>
+          <a:p>
+            <a:pPr algn="ctr"/>
+            <a:endParaRPr lang="en-US"/>
+          </a:p>
+        </p:txBody>
+      </p:sp>
+      <p:sp>
+        <p:nvSpPr>
+          <p:cNvPr id="2" name="Title 1">
+            <a:extLst>
+              <a:ext uri="{FF2B5EF4-FFF2-40B4-BE49-F238E27FC236}">
+                <a16:creationId xmlns:a16="http://schemas.microsoft.com/office/drawing/2014/main" id="{45B5BE27-983C-4AA0-8D81-2DD164C55907}"/>
+              </a:ext>
+            </a:extLst>
+          </p:cNvPr>
+          <p:cNvSpPr>
+            <a:spLocks noGrp="1"/>
+          </p:cNvSpPr>
+          <p:nvPr>
+            <p:ph type="title"/>
+          </p:nvPr>
+        </p:nvSpPr>
+        <p:spPr>
+          <a:xfrm>
+            <a:off x="643467" y="643467"/>
+            <a:ext cx="3363974" cy="1597315"/>
+          </a:xfrm>
+          <a:noFill/>
+          <a:ln w="19050">
+            <a:solidFill>
+              <a:schemeClr val="bg1"/>
+            </a:solidFill>
+          </a:ln>
+        </p:spPr>
+        <p:txBody>
+          <a:bodyPr wrap="square">
+            <a:normAutofit/>
+          </a:bodyPr>
+          <a:lstStyle/>
+          <a:p>
+            <a:pPr algn="ctr"/>
+            <a:r>
+              <a:rPr lang="en-US" sz="2800">
+                <a:solidFill>
+                  <a:schemeClr val="bg1"/>
+                </a:solidFill>
+              </a:rPr>
+              <a:t>Dataset</a:t>
+            </a:r>
+          </a:p>
+        </p:txBody>
+      </p:sp>
+      <p:sp>
+        <p:nvSpPr>
+          <p:cNvPr id="3" name="Content Placeholder 2">
+            <a:extLst>
+              <a:ext uri="{FF2B5EF4-FFF2-40B4-BE49-F238E27FC236}">
+                <a16:creationId xmlns:a16="http://schemas.microsoft.com/office/drawing/2014/main" id="{D169D423-80B3-459F-8910-6C9C1072A93D}"/>
+              </a:ext>
+            </a:extLst>
+          </p:cNvPr>
+          <p:cNvSpPr>
+            <a:spLocks noGrp="1"/>
+          </p:cNvSpPr>
+          <p:nvPr>
+            <p:ph idx="1"/>
+          </p:nvPr>
+        </p:nvSpPr>
+        <p:spPr>
+          <a:xfrm>
+            <a:off x="643468" y="2638044"/>
+            <a:ext cx="3363974" cy="3415622"/>
+          </a:xfrm>
+        </p:spPr>
+        <p:txBody>
+          <a:bodyPr>
+            <a:normAutofit/>
+          </a:bodyPr>
+          <a:lstStyle/>
+          <a:p>
+            <a:r>
+              <a:rPr lang="en-US" sz="2000">
+                <a:solidFill>
+                  <a:schemeClr val="bg1"/>
+                </a:solidFill>
+              </a:rPr>
+              <a:t>Brazilian E-commerce Public Dataset by Olist</a:t>
+            </a:r>
+          </a:p>
+          <a:p>
+            <a:r>
+              <a:rPr lang="en-US" sz="2000">
+                <a:solidFill>
+                  <a:schemeClr val="bg1"/>
+                </a:solidFill>
+              </a:rPr>
+              <a:t>Contains over 100,000 orders with product, customer, and reviews info.</a:t>
+            </a:r>
+          </a:p>
+          <a:p>
+            <a:endParaRPr lang="en-US" sz="2000">
+              <a:solidFill>
+                <a:schemeClr val="bg1"/>
+              </a:solidFill>
+            </a:endParaRPr>
+          </a:p>
+        </p:txBody>
+      </p:sp>
+      <p:pic>
+        <p:nvPicPr>
+          <p:cNvPr id="1026" name="Picture 2" descr="Data Schema">
+            <a:extLst>
+              <a:ext uri="{FF2B5EF4-FFF2-40B4-BE49-F238E27FC236}">
+                <a16:creationId xmlns:a16="http://schemas.microsoft.com/office/drawing/2014/main" id="{D5F0EBA0-ECD9-49DD-B4A7-9FA4485A1B66}"/>
+              </a:ext>
+            </a:extLst>
+          </p:cNvPr>
+          <p:cNvPicPr>
+            <a:picLocks noChangeAspect="1" noChangeArrowheads="1"/>
+          </p:cNvPicPr>
+          <p:nvPr/>
+        </p:nvPicPr>
+        <p:blipFill>
+          <a:blip r:embed="rId2">
+            <a:extLst>
+              <a:ext uri="{28A0092B-C50C-407E-A947-70E740481C1C}">
+                <a14:useLocalDpi xmlns:a14="http://schemas.microsoft.com/office/drawing/2010/main" val="0"/>
+              </a:ext>
+            </a:extLst>
+          </a:blip>
+          <a:srcRect/>
+          <a:stretch>
+            <a:fillRect/>
+          </a:stretch>
+        </p:blipFill>
+        <p:spPr bwMode="auto">
+          <a:xfrm>
+            <a:off x="5297763" y="1465523"/>
+            <a:ext cx="6250769" cy="3766087"/>
+          </a:xfrm>
+          <a:prstGeom prst="rect">
+            <a:avLst/>
+          </a:prstGeom>
+          <a:noFill/>
+          <a:extLst>
+            <a:ext uri="{909E8E84-426E-40DD-AFC4-6F175D3DCCD1}">
+              <a14:hiddenFill xmlns:a14="http://schemas.microsoft.com/office/drawing/2010/main">
+                <a:solidFill>
+                  <a:srgbClr val="FFFFFF"/>
+                </a:solidFill>
+              </a14:hiddenFill>
+            </a:ext>
+          </a:extLst>
+        </p:spPr>
+      </p:pic>
+    </p:spTree>
+    <p:extLst>
+      <p:ext uri="{BB962C8B-B14F-4D97-AF65-F5344CB8AC3E}">
+        <p14:creationId xmlns:p14="http://schemas.microsoft.com/office/powerpoint/2010/main" val="308893329"/>
+      </p:ext>
+    </p:extLst>
+  </p:cSld>
+  <p:clrMapOvr>
+    <a:masterClrMapping/>
+  </p:clrMapOvr>
+</p:sld>
+</file>
+
+<file path=ppt/slides/slide3.xml><?xml version="1.0" encoding="utf-8"?>
 <p:sld xmlns:a="http://schemas.openxmlformats.org/drawingml/2006/main" xmlns:r="http://schemas.openxmlformats.org/officeDocument/2006/relationships" xmlns:p="http://schemas.openxmlformats.org/presentationml/2006/main">
   <p:cSld>
     <p:spTree>
@@ -3532,7 +4388,7 @@
 </p:sld>
 </file>
 
-<file path=ppt/slides/slide3.xml><?xml version="1.0" encoding="utf-8"?>
+<file path=ppt/slides/slide4.xml><?xml version="1.0" encoding="utf-8"?>
 <p:sld xmlns:a="http://schemas.openxmlformats.org/drawingml/2006/main" xmlns:r="http://schemas.openxmlformats.org/officeDocument/2006/relationships" xmlns:p="http://schemas.openxmlformats.org/presentationml/2006/main">
   <p:cSld>
     <p:spTree>
@@ -3659,7 +4515,7 @@
 </p:sld>
 </file>
 
-<file path=ppt/slides/slide4.xml><?xml version="1.0" encoding="utf-8"?>
+<file path=ppt/slides/slide5.xml><?xml version="1.0" encoding="utf-8"?>
 <p:sld xmlns:a="http://schemas.openxmlformats.org/drawingml/2006/main" xmlns:r="http://schemas.openxmlformats.org/officeDocument/2006/relationships" xmlns:p="http://schemas.openxmlformats.org/presentationml/2006/main">
   <p:cSld>
     <p:spTree>
@@ -3699,7 +4555,7 @@
           <a:p>
             <a:r>
               <a:rPr lang="en-US" dirty="0"/>
-              <a:t>EDA		</a:t>
+              <a:t>Exploratory Data Analysis</a:t>
             </a:r>
           </a:p>
         </p:txBody>
@@ -3778,7 +4634,7 @@
 </p:sld>
 </file>
 
-<file path=ppt/slides/slide5.xml><?xml version="1.0" encoding="utf-8"?>
+<file path=ppt/slides/slide6.xml><?xml version="1.0" encoding="utf-8"?>
 <p:sld xmlns:a="http://schemas.openxmlformats.org/drawingml/2006/main" xmlns:r="http://schemas.openxmlformats.org/officeDocument/2006/relationships" xmlns:p="http://schemas.openxmlformats.org/presentationml/2006/main">
   <p:cSld>
     <p:spTree>
@@ -3900,7 +4756,87 @@
 </p:sld>
 </file>
 
-<file path=ppt/slides/slide6.xml><?xml version="1.0" encoding="utf-8"?>
+<file path=ppt/slides/slide7.xml><?xml version="1.0" encoding="utf-8"?>
+<p:sld xmlns:a="http://schemas.openxmlformats.org/drawingml/2006/main" xmlns:r="http://schemas.openxmlformats.org/officeDocument/2006/relationships" xmlns:p="http://schemas.openxmlformats.org/presentationml/2006/main">
+  <p:cSld>
+    <p:spTree>
+      <p:nvGrpSpPr>
+        <p:cNvPr id="1" name=""/>
+        <p:cNvGrpSpPr/>
+        <p:nvPr/>
+      </p:nvGrpSpPr>
+      <p:grpSpPr>
+        <a:xfrm>
+          <a:off x="0" y="0"/>
+          <a:ext cx="0" cy="0"/>
+          <a:chOff x="0" y="0"/>
+          <a:chExt cx="0" cy="0"/>
+        </a:xfrm>
+      </p:grpSpPr>
+      <p:sp>
+        <p:nvSpPr>
+          <p:cNvPr id="2" name="Title 1">
+            <a:extLst>
+              <a:ext uri="{FF2B5EF4-FFF2-40B4-BE49-F238E27FC236}">
+                <a16:creationId xmlns:a16="http://schemas.microsoft.com/office/drawing/2014/main" id="{F825CB6F-5E5E-4535-B9AC-C5EF834F5E45}"/>
+              </a:ext>
+            </a:extLst>
+          </p:cNvPr>
+          <p:cNvSpPr>
+            <a:spLocks noGrp="1"/>
+          </p:cNvSpPr>
+          <p:nvPr>
+            <p:ph type="title"/>
+          </p:nvPr>
+        </p:nvSpPr>
+        <p:spPr/>
+        <p:txBody>
+          <a:bodyPr/>
+          <a:lstStyle/>
+          <a:p>
+            <a:endParaRPr lang="en-US"/>
+          </a:p>
+        </p:txBody>
+      </p:sp>
+      <p:sp>
+        <p:nvSpPr>
+          <p:cNvPr id="3" name="Content Placeholder 2">
+            <a:extLst>
+              <a:ext uri="{FF2B5EF4-FFF2-40B4-BE49-F238E27FC236}">
+                <a16:creationId xmlns:a16="http://schemas.microsoft.com/office/drawing/2014/main" id="{8939283D-73C5-4995-B6B0-70FCB4A0C7D0}"/>
+              </a:ext>
+            </a:extLst>
+          </p:cNvPr>
+          <p:cNvSpPr>
+            <a:spLocks noGrp="1"/>
+          </p:cNvSpPr>
+          <p:nvPr>
+            <p:ph idx="1"/>
+          </p:nvPr>
+        </p:nvSpPr>
+        <p:spPr/>
+        <p:txBody>
+          <a:bodyPr/>
+          <a:lstStyle/>
+          <a:p>
+            <a:endParaRPr lang="en-US"/>
+          </a:p>
+        </p:txBody>
+      </p:sp>
+    </p:spTree>
+    <p:extLst>
+      <p:ext uri="{BB962C8B-B14F-4D97-AF65-F5344CB8AC3E}">
+        <p14:creationId xmlns:p14="http://schemas.microsoft.com/office/powerpoint/2010/main" val="1853052470"/>
+      </p:ext>
+    </p:extLst>
+  </p:cSld>
+  <p:clrMapOvr>
+    <a:masterClrMapping/>
+  </p:clrMapOvr>
+</p:sld>
+</file>
+
+<file path=ppt/slides/slide8.xml><?xml version="1.0" encoding="utf-8"?>
 <p:sld xmlns:a="http://schemas.openxmlformats.org/drawingml/2006/main" xmlns:r="http://schemas.openxmlformats.org/officeDocument/2006/relationships" xmlns:p="http://schemas.openxmlformats.org/presentationml/2006/main">
   <p:cSld>
     <p:spTree>

</xml_diff>